<commit_message>
Adding the complete E2E structure for trends.
</commit_message>
<xml_diff>
--- a/resources/Presentation1.pptx
+++ b/resources/Presentation1.pptx
@@ -20,7 +20,8 @@
     <p:sldId id="278" r:id="rId14"/>
     <p:sldId id="279" r:id="rId15"/>
     <p:sldId id="280" r:id="rId16"/>
-    <p:sldId id="281" r:id="rId17"/>
+    <p:sldId id="283" r:id="rId17"/>
+    <p:sldId id="281" r:id="rId18"/>
   </p:sldIdLst>
   <p:sldSz cx="12192000" cy="6858000"/>
   <p:notesSz cx="6858000" cy="9144000"/>
@@ -5834,42 +5835,6 @@
         </a:p>
       </dgm:t>
     </dgm:pt>
-    <dgm:pt modelId="{C12CFEDA-22A5-48D4-93FE-CE4797E758E1}">
-      <dgm:prSet/>
-      <dgm:spPr/>
-      <dgm:t>
-        <a:bodyPr/>
-        <a:lstStyle/>
-        <a:p>
-          <a:r>
-            <a:rPr lang="en-US" dirty="0"/>
-            <a:t>Is there a relationship between mother’s age and her child survival?</a:t>
-          </a:r>
-        </a:p>
-      </dgm:t>
-    </dgm:pt>
-    <dgm:pt modelId="{65291A27-7989-4CCB-BF6C-042CC605E5D8}" type="parTrans" cxnId="{04BA178C-DC95-4690-B64F-AA0ED624DD88}">
-      <dgm:prSet/>
-      <dgm:spPr/>
-      <dgm:t>
-        <a:bodyPr/>
-        <a:lstStyle/>
-        <a:p>
-          <a:endParaRPr lang="en-US"/>
-        </a:p>
-      </dgm:t>
-    </dgm:pt>
-    <dgm:pt modelId="{A29CE240-2CFB-446D-B9C1-B07C3256AE50}" type="sibTrans" cxnId="{04BA178C-DC95-4690-B64F-AA0ED624DD88}">
-      <dgm:prSet/>
-      <dgm:spPr/>
-      <dgm:t>
-        <a:bodyPr/>
-        <a:lstStyle/>
-        <a:p>
-          <a:endParaRPr lang="en-US"/>
-        </a:p>
-      </dgm:t>
-    </dgm:pt>
     <dgm:pt modelId="{7A34A23B-A704-40C9-BB91-832FC06ED443}">
       <dgm:prSet/>
       <dgm:spPr/>
@@ -5952,7 +5917,7 @@
       <dgm:spPr/>
     </dgm:pt>
     <dgm:pt modelId="{1D4A40A3-3135-7445-8FA2-2315493FE59C}" type="pres">
-      <dgm:prSet presAssocID="{D417EF26-EFBA-4F85-952C-8B3726356F29}" presName="node" presStyleLbl="node1" presStyleIdx="0" presStyleCnt="5">
+      <dgm:prSet presAssocID="{D417EF26-EFBA-4F85-952C-8B3726356F29}" presName="node" presStyleLbl="node1" presStyleIdx="0" presStyleCnt="4">
         <dgm:presLayoutVars>
           <dgm:bulletEnabled val="1"/>
         </dgm:presLayoutVars>
@@ -5964,7 +5929,7 @@
       <dgm:spPr/>
     </dgm:pt>
     <dgm:pt modelId="{B0048D99-7AC0-B449-90CD-14966C137826}" type="pres">
-      <dgm:prSet presAssocID="{113DF24C-C891-4258-A323-E936D1A941D0}" presName="node" presStyleLbl="node1" presStyleIdx="1" presStyleCnt="5">
+      <dgm:prSet presAssocID="{113DF24C-C891-4258-A323-E936D1A941D0}" presName="node" presStyleLbl="node1" presStyleIdx="1" presStyleCnt="4">
         <dgm:presLayoutVars>
           <dgm:bulletEnabled val="1"/>
         </dgm:presLayoutVars>
@@ -5975,20 +5940,8 @@
       <dgm:prSet presAssocID="{9A0B3788-1E5F-4DC5-8DFD-7179114F6171}" presName="sibTrans" presStyleCnt="0"/>
       <dgm:spPr/>
     </dgm:pt>
-    <dgm:pt modelId="{59ACB785-DB47-2A42-A47A-73AFCF4EE0BC}" type="pres">
-      <dgm:prSet presAssocID="{C12CFEDA-22A5-48D4-93FE-CE4797E758E1}" presName="node" presStyleLbl="node1" presStyleIdx="2" presStyleCnt="5">
-        <dgm:presLayoutVars>
-          <dgm:bulletEnabled val="1"/>
-        </dgm:presLayoutVars>
-      </dgm:prSet>
-      <dgm:spPr/>
-    </dgm:pt>
-    <dgm:pt modelId="{C8552B73-8764-4247-8ABF-089A1B82D90C}" type="pres">
-      <dgm:prSet presAssocID="{A29CE240-2CFB-446D-B9C1-B07C3256AE50}" presName="sibTrans" presStyleCnt="0"/>
-      <dgm:spPr/>
-    </dgm:pt>
     <dgm:pt modelId="{19C363F9-FA03-6C4E-9CD6-6A2494D0C62D}" type="pres">
-      <dgm:prSet presAssocID="{7A34A23B-A704-40C9-BB91-832FC06ED443}" presName="node" presStyleLbl="node1" presStyleIdx="3" presStyleCnt="5">
+      <dgm:prSet presAssocID="{7A34A23B-A704-40C9-BB91-832FC06ED443}" presName="node" presStyleLbl="node1" presStyleIdx="2" presStyleCnt="4">
         <dgm:presLayoutVars>
           <dgm:bulletEnabled val="1"/>
         </dgm:presLayoutVars>
@@ -6000,7 +5953,7 @@
       <dgm:spPr/>
     </dgm:pt>
     <dgm:pt modelId="{DD8FAB99-7DB4-C442-A2B5-28CB9FBD0851}" type="pres">
-      <dgm:prSet presAssocID="{0568E33E-E037-4FE2-B0CD-8C7EFAC278CA}" presName="node" presStyleLbl="node1" presStyleIdx="4" presStyleCnt="5">
+      <dgm:prSet presAssocID="{0568E33E-E037-4FE2-B0CD-8C7EFAC278CA}" presName="node" presStyleLbl="node1" presStyleIdx="3" presStyleCnt="4">
         <dgm:presLayoutVars>
           <dgm:bulletEnabled val="1"/>
         </dgm:presLayoutVars>
@@ -6010,25 +5963,21 @@
   </dgm:ptLst>
   <dgm:cxnLst>
     <dgm:cxn modelId="{CF44FE35-965D-4FC3-9442-B37BC64B5C66}" srcId="{16CC7A4C-5638-4973-AEA5-FE3CD9ED6530}" destId="{D417EF26-EFBA-4F85-952C-8B3726356F29}" srcOrd="0" destOrd="0" parTransId="{FFB4E842-8C12-4157-B54E-59FAF29A6298}" sibTransId="{09383C28-D70B-4984-BB1A-12A698141048}"/>
-    <dgm:cxn modelId="{06F9CD41-8952-8C44-952B-7533C83E6394}" type="presOf" srcId="{C12CFEDA-22A5-48D4-93FE-CE4797E758E1}" destId="{59ACB785-DB47-2A42-A47A-73AFCF4EE0BC}" srcOrd="0" destOrd="0" presId="urn:microsoft.com/office/officeart/2005/8/layout/default"/>
     <dgm:cxn modelId="{2CCA6276-4FDE-5D46-849B-62E82F8B21EE}" type="presOf" srcId="{0568E33E-E037-4FE2-B0CD-8C7EFAC278CA}" destId="{DD8FAB99-7DB4-C442-A2B5-28CB9FBD0851}" srcOrd="0" destOrd="0" presId="urn:microsoft.com/office/officeart/2005/8/layout/default"/>
-    <dgm:cxn modelId="{04BA178C-DC95-4690-B64F-AA0ED624DD88}" srcId="{16CC7A4C-5638-4973-AEA5-FE3CD9ED6530}" destId="{C12CFEDA-22A5-48D4-93FE-CE4797E758E1}" srcOrd="2" destOrd="0" parTransId="{65291A27-7989-4CCB-BF6C-042CC605E5D8}" sibTransId="{A29CE240-2CFB-446D-B9C1-B07C3256AE50}"/>
     <dgm:cxn modelId="{1AD6D18E-3092-7643-8E82-29257E3EEF00}" type="presOf" srcId="{7A34A23B-A704-40C9-BB91-832FC06ED443}" destId="{19C363F9-FA03-6C4E-9CD6-6A2494D0C62D}" srcOrd="0" destOrd="0" presId="urn:microsoft.com/office/officeart/2005/8/layout/default"/>
-    <dgm:cxn modelId="{AB570092-5126-4CC4-8B39-9473FA75DBC4}" srcId="{16CC7A4C-5638-4973-AEA5-FE3CD9ED6530}" destId="{7A34A23B-A704-40C9-BB91-832FC06ED443}" srcOrd="3" destOrd="0" parTransId="{EECBEA94-33DC-44EB-A5E1-4EAD3A17081C}" sibTransId="{49EF8DA6-66D2-4CD2-B2B0-18F7088D9895}"/>
+    <dgm:cxn modelId="{AB570092-5126-4CC4-8B39-9473FA75DBC4}" srcId="{16CC7A4C-5638-4973-AEA5-FE3CD9ED6530}" destId="{7A34A23B-A704-40C9-BB91-832FC06ED443}" srcOrd="2" destOrd="0" parTransId="{EECBEA94-33DC-44EB-A5E1-4EAD3A17081C}" sibTransId="{49EF8DA6-66D2-4CD2-B2B0-18F7088D9895}"/>
     <dgm:cxn modelId="{CCF8DFA0-1A71-CE46-A319-D2FE542926CA}" type="presOf" srcId="{16CC7A4C-5638-4973-AEA5-FE3CD9ED6530}" destId="{C9B4B28E-7693-554D-9374-0E7765E8B0C1}" srcOrd="0" destOrd="0" presId="urn:microsoft.com/office/officeart/2005/8/layout/default"/>
     <dgm:cxn modelId="{565F90BD-D209-B849-ADEB-528D7BE05044}" type="presOf" srcId="{113DF24C-C891-4258-A323-E936D1A941D0}" destId="{B0048D99-7AC0-B449-90CD-14966C137826}" srcOrd="0" destOrd="0" presId="urn:microsoft.com/office/officeart/2005/8/layout/default"/>
     <dgm:cxn modelId="{1880E1CC-684C-1B4C-BF18-7595DDB1578B}" type="presOf" srcId="{D417EF26-EFBA-4F85-952C-8B3726356F29}" destId="{1D4A40A3-3135-7445-8FA2-2315493FE59C}" srcOrd="0" destOrd="0" presId="urn:microsoft.com/office/officeart/2005/8/layout/default"/>
-    <dgm:cxn modelId="{7E76EAEF-8ACD-46BD-BB9B-5F333711D1ED}" srcId="{16CC7A4C-5638-4973-AEA5-FE3CD9ED6530}" destId="{0568E33E-E037-4FE2-B0CD-8C7EFAC278CA}" srcOrd="4" destOrd="0" parTransId="{19BF445C-0B80-43ED-A387-2BDC761C2A58}" sibTransId="{919184CF-0EEE-46DA-93A0-6ABAECD4C9F8}"/>
+    <dgm:cxn modelId="{7E76EAEF-8ACD-46BD-BB9B-5F333711D1ED}" srcId="{16CC7A4C-5638-4973-AEA5-FE3CD9ED6530}" destId="{0568E33E-E037-4FE2-B0CD-8C7EFAC278CA}" srcOrd="3" destOrd="0" parTransId="{19BF445C-0B80-43ED-A387-2BDC761C2A58}" sibTransId="{919184CF-0EEE-46DA-93A0-6ABAECD4C9F8}"/>
     <dgm:cxn modelId="{F7269DFB-96EC-448E-A42B-296C97D83B15}" srcId="{16CC7A4C-5638-4973-AEA5-FE3CD9ED6530}" destId="{113DF24C-C891-4258-A323-E936D1A941D0}" srcOrd="1" destOrd="0" parTransId="{6C4CC6C9-8C13-4AEB-95AC-FAEFF8271A2B}" sibTransId="{9A0B3788-1E5F-4DC5-8DFD-7179114F6171}"/>
     <dgm:cxn modelId="{6B7FF6E6-9950-AC4D-89BB-17DD14CF8085}" type="presParOf" srcId="{C9B4B28E-7693-554D-9374-0E7765E8B0C1}" destId="{1D4A40A3-3135-7445-8FA2-2315493FE59C}" srcOrd="0" destOrd="0" presId="urn:microsoft.com/office/officeart/2005/8/layout/default"/>
     <dgm:cxn modelId="{84111592-1E7C-F04C-BC75-4D5813CE46BB}" type="presParOf" srcId="{C9B4B28E-7693-554D-9374-0E7765E8B0C1}" destId="{2C15D6ED-4729-F44B-B44E-4B946D930C88}" srcOrd="1" destOrd="0" presId="urn:microsoft.com/office/officeart/2005/8/layout/default"/>
     <dgm:cxn modelId="{49E30D25-1BEE-A144-9A58-91D52C56D004}" type="presParOf" srcId="{C9B4B28E-7693-554D-9374-0E7765E8B0C1}" destId="{B0048D99-7AC0-B449-90CD-14966C137826}" srcOrd="2" destOrd="0" presId="urn:microsoft.com/office/officeart/2005/8/layout/default"/>
     <dgm:cxn modelId="{958A368E-CCC9-EA46-84B7-E96C3940716C}" type="presParOf" srcId="{C9B4B28E-7693-554D-9374-0E7765E8B0C1}" destId="{1112370F-9DD8-E94E-800C-3990B8904C9E}" srcOrd="3" destOrd="0" presId="urn:microsoft.com/office/officeart/2005/8/layout/default"/>
-    <dgm:cxn modelId="{85EAD6B2-CE42-4444-B5E7-63D5F45B03C6}" type="presParOf" srcId="{C9B4B28E-7693-554D-9374-0E7765E8B0C1}" destId="{59ACB785-DB47-2A42-A47A-73AFCF4EE0BC}" srcOrd="4" destOrd="0" presId="urn:microsoft.com/office/officeart/2005/8/layout/default"/>
-    <dgm:cxn modelId="{4EE543A6-6244-F345-9215-8A5660A60616}" type="presParOf" srcId="{C9B4B28E-7693-554D-9374-0E7765E8B0C1}" destId="{C8552B73-8764-4247-8ABF-089A1B82D90C}" srcOrd="5" destOrd="0" presId="urn:microsoft.com/office/officeart/2005/8/layout/default"/>
-    <dgm:cxn modelId="{879F6349-55F9-1346-B3C5-413A79BA455A}" type="presParOf" srcId="{C9B4B28E-7693-554D-9374-0E7765E8B0C1}" destId="{19C363F9-FA03-6C4E-9CD6-6A2494D0C62D}" srcOrd="6" destOrd="0" presId="urn:microsoft.com/office/officeart/2005/8/layout/default"/>
-    <dgm:cxn modelId="{88A95768-0E5E-3540-AA26-62D661A76DE0}" type="presParOf" srcId="{C9B4B28E-7693-554D-9374-0E7765E8B0C1}" destId="{92189CDF-14A8-A743-8651-76DB25D4D6B5}" srcOrd="7" destOrd="0" presId="urn:microsoft.com/office/officeart/2005/8/layout/default"/>
-    <dgm:cxn modelId="{8187785C-5CF7-B045-9D3E-4305B76EE696}" type="presParOf" srcId="{C9B4B28E-7693-554D-9374-0E7765E8B0C1}" destId="{DD8FAB99-7DB4-C442-A2B5-28CB9FBD0851}" srcOrd="8" destOrd="0" presId="urn:microsoft.com/office/officeart/2005/8/layout/default"/>
+    <dgm:cxn modelId="{879F6349-55F9-1346-B3C5-413A79BA455A}" type="presParOf" srcId="{C9B4B28E-7693-554D-9374-0E7765E8B0C1}" destId="{19C363F9-FA03-6C4E-9CD6-6A2494D0C62D}" srcOrd="4" destOrd="0" presId="urn:microsoft.com/office/officeart/2005/8/layout/default"/>
+    <dgm:cxn modelId="{88A95768-0E5E-3540-AA26-62D661A76DE0}" type="presParOf" srcId="{C9B4B28E-7693-554D-9374-0E7765E8B0C1}" destId="{92189CDF-14A8-A743-8651-76DB25D4D6B5}" srcOrd="5" destOrd="0" presId="urn:microsoft.com/office/officeart/2005/8/layout/default"/>
+    <dgm:cxn modelId="{8187785C-5CF7-B045-9D3E-4305B76EE696}" type="presParOf" srcId="{C9B4B28E-7693-554D-9374-0E7765E8B0C1}" destId="{DD8FAB99-7DB4-C442-A2B5-28CB9FBD0851}" srcOrd="6" destOrd="0" presId="urn:microsoft.com/office/officeart/2005/8/layout/default"/>
   </dgm:cxnLst>
   <dgm:bg/>
   <dgm:whole/>
@@ -8319,8 +8268,8 @@
       </dsp:nvSpPr>
       <dsp:spPr>
         <a:xfrm>
-          <a:off x="469238" y="218"/>
-          <a:ext cx="2752125" cy="1651275"/>
+          <a:off x="820" y="673488"/>
+          <a:ext cx="3198238" cy="1918943"/>
         </a:xfrm>
         <a:prstGeom prst="rect">
           <a:avLst/>
@@ -8362,12 +8311,12 @@
         </a:fontRef>
       </dsp:style>
       <dsp:txBody>
-        <a:bodyPr spcFirstLastPara="0" vert="horz" wrap="square" lIns="80010" tIns="80010" rIns="80010" bIns="80010" numCol="1" spcCol="1270" anchor="ctr" anchorCtr="0">
+        <a:bodyPr spcFirstLastPara="0" vert="horz" wrap="square" lIns="91440" tIns="91440" rIns="91440" bIns="91440" numCol="1" spcCol="1270" anchor="ctr" anchorCtr="0">
           <a:noAutofit/>
         </a:bodyPr>
         <a:lstStyle/>
         <a:p>
-          <a:pPr marL="0" lvl="0" indent="0" algn="ctr" defTabSz="933450">
+          <a:pPr marL="0" lvl="0" indent="0" algn="ctr" defTabSz="1066800">
             <a:lnSpc>
               <a:spcPct val="90000"/>
             </a:lnSpc>
@@ -8380,14 +8329,14 @@
             <a:buNone/>
           </a:pPr>
           <a:r>
-            <a:rPr lang="en-US" sz="2100" kern="1200" dirty="0"/>
+            <a:rPr lang="en-US" sz="2400" kern="1200" dirty="0"/>
             <a:t>Some interesting population growth trends of 228 countries. </a:t>
           </a:r>
         </a:p>
       </dsp:txBody>
       <dsp:txXfrm>
-        <a:off x="469238" y="218"/>
-        <a:ext cx="2752125" cy="1651275"/>
+        <a:off x="820" y="673488"/>
+        <a:ext cx="3198238" cy="1918943"/>
       </dsp:txXfrm>
     </dsp:sp>
     <dsp:sp modelId="{B0048D99-7AC0-B449-90CD-14966C137826}">
@@ -8397,8 +8346,8 @@
       </dsp:nvSpPr>
       <dsp:spPr>
         <a:xfrm>
-          <a:off x="3496576" y="218"/>
-          <a:ext cx="2752125" cy="1651275"/>
+          <a:off x="3518882" y="673488"/>
+          <a:ext cx="3198238" cy="1918943"/>
         </a:xfrm>
         <a:prstGeom prst="rect">
           <a:avLst/>
@@ -8440,12 +8389,12 @@
         </a:fontRef>
       </dsp:style>
       <dsp:txBody>
-        <a:bodyPr spcFirstLastPara="0" vert="horz" wrap="square" lIns="80010" tIns="80010" rIns="80010" bIns="80010" numCol="1" spcCol="1270" anchor="ctr" anchorCtr="0">
+        <a:bodyPr spcFirstLastPara="0" vert="horz" wrap="square" lIns="91440" tIns="91440" rIns="91440" bIns="91440" numCol="1" spcCol="1270" anchor="ctr" anchorCtr="0">
           <a:noAutofit/>
         </a:bodyPr>
         <a:lstStyle/>
         <a:p>
-          <a:pPr marL="0" lvl="0" indent="0" algn="ctr" defTabSz="933450">
+          <a:pPr marL="0" lvl="0" indent="0" algn="ctr" defTabSz="1066800">
             <a:lnSpc>
               <a:spcPct val="90000"/>
             </a:lnSpc>
@@ -8458,25 +8407,25 @@
             <a:buNone/>
           </a:pPr>
           <a:r>
-            <a:rPr lang="en-US" sz="2100" kern="1200" dirty="0"/>
+            <a:rPr lang="en-US" sz="2400" kern="1200" dirty="0"/>
             <a:t>Some insights distinctions countries based on population density. </a:t>
           </a:r>
         </a:p>
       </dsp:txBody>
       <dsp:txXfrm>
-        <a:off x="3496576" y="218"/>
-        <a:ext cx="2752125" cy="1651275"/>
+        <a:off x="3518882" y="673488"/>
+        <a:ext cx="3198238" cy="1918943"/>
       </dsp:txXfrm>
     </dsp:sp>
-    <dsp:sp modelId="{59ACB785-DB47-2A42-A47A-73AFCF4EE0BC}">
+    <dsp:sp modelId="{19C363F9-FA03-6C4E-9CD6-6A2494D0C62D}">
       <dsp:nvSpPr>
         <dsp:cNvPr id="0" name=""/>
         <dsp:cNvSpPr/>
       </dsp:nvSpPr>
       <dsp:spPr>
         <a:xfrm>
-          <a:off x="469238" y="1926706"/>
-          <a:ext cx="2752125" cy="1651275"/>
+          <a:off x="820" y="2912255"/>
+          <a:ext cx="3198238" cy="1918943"/>
         </a:xfrm>
         <a:prstGeom prst="rect">
           <a:avLst/>
@@ -8518,12 +8467,12 @@
         </a:fontRef>
       </dsp:style>
       <dsp:txBody>
-        <a:bodyPr spcFirstLastPara="0" vert="horz" wrap="square" lIns="80010" tIns="80010" rIns="80010" bIns="80010" numCol="1" spcCol="1270" anchor="ctr" anchorCtr="0">
+        <a:bodyPr spcFirstLastPara="0" vert="horz" wrap="square" lIns="91440" tIns="91440" rIns="91440" bIns="91440" numCol="1" spcCol="1270" anchor="ctr" anchorCtr="0">
           <a:noAutofit/>
         </a:bodyPr>
         <a:lstStyle/>
         <a:p>
-          <a:pPr marL="0" lvl="0" indent="0" algn="ctr" defTabSz="933450">
+          <a:pPr marL="0" lvl="0" indent="0" algn="ctr" defTabSz="1066800">
             <a:lnSpc>
               <a:spcPct val="90000"/>
             </a:lnSpc>
@@ -8536,25 +8485,25 @@
             <a:buNone/>
           </a:pPr>
           <a:r>
-            <a:rPr lang="en-US" sz="2100" kern="1200" dirty="0"/>
-            <a:t>Is there a relationship between mother’s age and her child survival?</a:t>
+            <a:rPr lang="en-US" sz="2400" kern="1200" dirty="0"/>
+            <a:t>Which gender is better surviving under the age of 5? </a:t>
           </a:r>
         </a:p>
       </dsp:txBody>
       <dsp:txXfrm>
-        <a:off x="469238" y="1926706"/>
-        <a:ext cx="2752125" cy="1651275"/>
+        <a:off x="820" y="2912255"/>
+        <a:ext cx="3198238" cy="1918943"/>
       </dsp:txXfrm>
     </dsp:sp>
-    <dsp:sp modelId="{19C363F9-FA03-6C4E-9CD6-6A2494D0C62D}">
+    <dsp:sp modelId="{DD8FAB99-7DB4-C442-A2B5-28CB9FBD0851}">
       <dsp:nvSpPr>
         <dsp:cNvPr id="0" name=""/>
         <dsp:cNvSpPr/>
       </dsp:nvSpPr>
       <dsp:spPr>
         <a:xfrm>
-          <a:off x="3496576" y="1926706"/>
-          <a:ext cx="2752125" cy="1651275"/>
+          <a:off x="3518882" y="2912255"/>
+          <a:ext cx="3198238" cy="1918943"/>
         </a:xfrm>
         <a:prstGeom prst="rect">
           <a:avLst/>
@@ -8596,12 +8545,12 @@
         </a:fontRef>
       </dsp:style>
       <dsp:txBody>
-        <a:bodyPr spcFirstLastPara="0" vert="horz" wrap="square" lIns="80010" tIns="80010" rIns="80010" bIns="80010" numCol="1" spcCol="1270" anchor="ctr" anchorCtr="0">
+        <a:bodyPr spcFirstLastPara="0" vert="horz" wrap="square" lIns="91440" tIns="91440" rIns="91440" bIns="91440" numCol="1" spcCol="1270" anchor="ctr" anchorCtr="0">
           <a:noAutofit/>
         </a:bodyPr>
         <a:lstStyle/>
         <a:p>
-          <a:pPr marL="0" lvl="0" indent="0" algn="ctr" defTabSz="933450">
+          <a:pPr marL="0" lvl="0" indent="0" algn="ctr" defTabSz="1066800">
             <a:lnSpc>
               <a:spcPct val="90000"/>
             </a:lnSpc>
@@ -8614,92 +8563,14 @@
             <a:buNone/>
           </a:pPr>
           <a:r>
-            <a:rPr lang="en-US" sz="2100" kern="1200" dirty="0"/>
-            <a:t>Which gender is better surviving under the age of 5? </a:t>
-          </a:r>
-        </a:p>
-      </dsp:txBody>
-      <dsp:txXfrm>
-        <a:off x="3496576" y="1926706"/>
-        <a:ext cx="2752125" cy="1651275"/>
-      </dsp:txXfrm>
-    </dsp:sp>
-    <dsp:sp modelId="{DD8FAB99-7DB4-C442-A2B5-28CB9FBD0851}">
-      <dsp:nvSpPr>
-        <dsp:cNvPr id="0" name=""/>
-        <dsp:cNvSpPr/>
-      </dsp:nvSpPr>
-      <dsp:spPr>
-        <a:xfrm>
-          <a:off x="1982907" y="3853194"/>
-          <a:ext cx="2752125" cy="1651275"/>
-        </a:xfrm>
-        <a:prstGeom prst="rect">
-          <a:avLst/>
-        </a:prstGeom>
-        <a:solidFill>
-          <a:schemeClr val="accent6">
-            <a:hueOff val="0"/>
-            <a:satOff val="0"/>
-            <a:lumOff val="0"/>
-            <a:alphaOff val="0"/>
-          </a:schemeClr>
-        </a:solidFill>
-        <a:ln w="12700" cap="flat" cmpd="sng" algn="ctr">
-          <a:solidFill>
-            <a:schemeClr val="lt1">
-              <a:hueOff val="0"/>
-              <a:satOff val="0"/>
-              <a:lumOff val="0"/>
-              <a:alphaOff val="0"/>
-            </a:schemeClr>
-          </a:solidFill>
-          <a:prstDash val="solid"/>
-          <a:miter lim="800000"/>
-        </a:ln>
-        <a:effectLst/>
-      </dsp:spPr>
-      <dsp:style>
-        <a:lnRef idx="2">
-          <a:scrgbClr r="0" g="0" b="0"/>
-        </a:lnRef>
-        <a:fillRef idx="1">
-          <a:scrgbClr r="0" g="0" b="0"/>
-        </a:fillRef>
-        <a:effectRef idx="0">
-          <a:scrgbClr r="0" g="0" b="0"/>
-        </a:effectRef>
-        <a:fontRef idx="minor">
-          <a:schemeClr val="lt1"/>
-        </a:fontRef>
-      </dsp:style>
-      <dsp:txBody>
-        <a:bodyPr spcFirstLastPara="0" vert="horz" wrap="square" lIns="80010" tIns="80010" rIns="80010" bIns="80010" numCol="1" spcCol="1270" anchor="ctr" anchorCtr="0">
-          <a:noAutofit/>
-        </a:bodyPr>
-        <a:lstStyle/>
-        <a:p>
-          <a:pPr marL="0" lvl="0" indent="0" algn="ctr" defTabSz="933450">
-            <a:lnSpc>
-              <a:spcPct val="90000"/>
-            </a:lnSpc>
-            <a:spcBef>
-              <a:spcPct val="0"/>
-            </a:spcBef>
-            <a:spcAft>
-              <a:spcPct val="35000"/>
-            </a:spcAft>
-            <a:buNone/>
-          </a:pPr>
-          <a:r>
-            <a:rPr lang="en-US" sz="2100" kern="1200" dirty="0"/>
+            <a:rPr lang="en-US" sz="2400" kern="1200" dirty="0"/>
             <a:t>Distribution of the ages of migrating people and the average age of a country. </a:t>
           </a:r>
         </a:p>
       </dsp:txBody>
       <dsp:txXfrm>
-        <a:off x="1982907" y="3853194"/>
-        <a:ext cx="2752125" cy="1651275"/>
+        <a:off x="3518882" y="2912255"/>
+        <a:ext cx="3198238" cy="1918943"/>
       </dsp:txXfrm>
     </dsp:sp>
   </dsp:spTree>
@@ -23427,7 +23298,7 @@
           <p:cNvPr id="2" name="Title 1">
             <a:extLst>
               <a:ext uri="{FF2B5EF4-FFF2-40B4-BE49-F238E27FC236}">
-                <a16:creationId xmlns:a16="http://schemas.microsoft.com/office/drawing/2014/main" id="{508747C2-D1EE-EB42-A59A-DE3AB887EA0F}"/>
+                <a16:creationId xmlns:a16="http://schemas.microsoft.com/office/drawing/2014/main" id="{8AF85572-29DE-3C45-8C02-1EA82A7E2417}"/>
               </a:ext>
             </a:extLst>
           </p:cNvPr>
@@ -23438,7 +23309,12 @@
             <p:ph type="title"/>
           </p:nvPr>
         </p:nvSpPr>
-        <p:spPr/>
+        <p:spPr>
+          <a:xfrm>
+            <a:off x="839788" y="457200"/>
+            <a:ext cx="3932237" cy="2971800"/>
+          </a:xfrm>
+        </p:spPr>
         <p:txBody>
           <a:bodyPr/>
           <a:lstStyle/>
@@ -23455,7 +23331,7 @@
           <p:cNvPr id="3" name="Content Placeholder 2">
             <a:extLst>
               <a:ext uri="{FF2B5EF4-FFF2-40B4-BE49-F238E27FC236}">
-                <a16:creationId xmlns:a16="http://schemas.microsoft.com/office/drawing/2014/main" id="{B19930CA-7FF7-2D47-9390-CA198C1EF8B9}"/>
+                <a16:creationId xmlns:a16="http://schemas.microsoft.com/office/drawing/2014/main" id="{F2D93E56-D6A6-6D4A-A55F-02FB8D82EAFE}"/>
               </a:ext>
             </a:extLst>
           </p:cNvPr>
@@ -23473,21 +23349,126 @@
           <a:p>
             <a:endParaRPr lang="en-US" dirty="0"/>
           </a:p>
+          <a:p>
+            <a:r>
+              <a:rPr lang="en-US" dirty="0"/>
+              <a:t>Make changes based on feedback.</a:t>
+            </a:r>
+          </a:p>
+          <a:p>
+            <a:r>
+              <a:rPr lang="en-US" dirty="0"/>
+              <a:t>Enable bar and pie charts for remaining questions.</a:t>
+            </a:r>
+          </a:p>
+          <a:p>
+            <a:r>
+              <a:rPr lang="en-US" dirty="0"/>
+              <a:t>Add vertical line tooltip to canvas.</a:t>
+            </a:r>
+          </a:p>
+          <a:p>
+            <a:r>
+              <a:rPr lang="en-US" dirty="0"/>
+              <a:t>Get more interesting findings from the data.</a:t>
+            </a:r>
+          </a:p>
+          <a:p>
+            <a:r>
+              <a:rPr lang="en-US" dirty="0"/>
+              <a:t>Final report &amp; video.</a:t>
+            </a:r>
+          </a:p>
+        </p:txBody>
+      </p:sp>
+    </p:spTree>
+    <p:extLst>
+      <p:ext uri="{BB962C8B-B14F-4D97-AF65-F5344CB8AC3E}">
+        <p14:creationId xmlns:p14="http://schemas.microsoft.com/office/powerpoint/2010/main" val="1949384408"/>
+      </p:ext>
+    </p:extLst>
+  </p:cSld>
+  <p:clrMapOvr>
+    <a:masterClrMapping/>
+  </p:clrMapOvr>
+</p:sld>
+</file>
+
+<file path=ppt/slides/slide17.xml><?xml version="1.0" encoding="utf-8"?>
+<p:sld xmlns:a="http://schemas.openxmlformats.org/drawingml/2006/main" xmlns:r="http://schemas.openxmlformats.org/officeDocument/2006/relationships" xmlns:p="http://schemas.openxmlformats.org/presentationml/2006/main">
+  <p:cSld>
+    <p:bg>
+      <p:bgPr>
+        <a:solidFill>
+          <a:schemeClr val="bg1"/>
+        </a:solidFill>
+        <a:effectLst/>
+      </p:bgPr>
+    </p:bg>
+    <p:spTree>
+      <p:nvGrpSpPr>
+        <p:cNvPr id="1" name=""/>
+        <p:cNvGrpSpPr/>
+        <p:nvPr/>
+      </p:nvGrpSpPr>
+      <p:grpSpPr>
+        <a:xfrm>
+          <a:off x="0" y="0"/>
+          <a:ext cx="0" cy="0"/>
+          <a:chOff x="0" y="0"/>
+          <a:chExt cx="0" cy="0"/>
+        </a:xfrm>
+      </p:grpSpPr>
+      <p:sp>
+        <p:nvSpPr>
+          <p:cNvPr id="2" name="Title 1">
+            <a:extLst>
+              <a:ext uri="{FF2B5EF4-FFF2-40B4-BE49-F238E27FC236}">
+                <a16:creationId xmlns:a16="http://schemas.microsoft.com/office/drawing/2014/main" id="{508747C2-D1EE-EB42-A59A-DE3AB887EA0F}"/>
+              </a:ext>
+            </a:extLst>
+          </p:cNvPr>
+          <p:cNvSpPr>
+            <a:spLocks noGrp="1"/>
+          </p:cNvSpPr>
+          <p:nvPr>
+            <p:ph type="title"/>
+          </p:nvPr>
+        </p:nvSpPr>
+        <p:spPr>
+          <a:xfrm>
+            <a:off x="838200" y="365125"/>
+            <a:ext cx="10515600" cy="1325563"/>
+          </a:xfrm>
+        </p:spPr>
+        <p:txBody>
+          <a:bodyPr vert="horz" lIns="91440" tIns="45720" rIns="91440" bIns="45720" rtlCol="0" anchor="ctr">
+            <a:normAutofit/>
+          </a:bodyPr>
+          <a:lstStyle/>
+          <a:p>
+            <a:r>
+              <a:rPr lang="en-US" b="1" dirty="0"/>
+              <a:t>Timeline</a:t>
+            </a:r>
+          </a:p>
         </p:txBody>
       </p:sp>
       <p:pic>
         <p:nvPicPr>
-          <p:cNvPr id="5" name="Picture 4">
+          <p:cNvPr id="5" name="Content Placeholder 4" descr="A screenshot of a cell phone&#10;&#10;Description automatically generated">
             <a:extLst>
               <a:ext uri="{FF2B5EF4-FFF2-40B4-BE49-F238E27FC236}">
-                <a16:creationId xmlns:a16="http://schemas.microsoft.com/office/drawing/2014/main" id="{76D46765-FA68-6F44-857E-16A1C311120C}"/>
+                <a16:creationId xmlns:a16="http://schemas.microsoft.com/office/drawing/2014/main" id="{021D3F28-DEE3-0447-AAA6-D48FD923A149}"/>
               </a:ext>
             </a:extLst>
           </p:cNvPr>
           <p:cNvPicPr>
-            <a:picLocks noChangeAspect="1"/>
+            <a:picLocks noGrp="1" noChangeAspect="1"/>
           </p:cNvPicPr>
-          <p:nvPr/>
+          <p:nvPr>
+            <p:ph idx="1"/>
+          </p:nvPr>
         </p:nvPicPr>
         <p:blipFill>
           <a:blip r:embed="rId2"/>
@@ -23497,12 +23478,9 @@
         </p:blipFill>
         <p:spPr>
           <a:xfrm>
-            <a:off x="0" y="1825624"/>
-            <a:ext cx="12192000" cy="3453385"/>
+            <a:off x="838200" y="1690688"/>
+            <a:ext cx="10979426" cy="4322486"/>
           </a:xfrm>
-          <a:prstGeom prst="rect">
-            <a:avLst/>
-          </a:prstGeom>
         </p:spPr>
       </p:pic>
     </p:spTree>
@@ -24171,36 +24149,6 @@
           </a:p>
         </p:txBody>
       </p:sp>
-      <p:sp>
-        <p:nvSpPr>
-          <p:cNvPr id="4" name="Text Placeholder 3">
-            <a:extLst>
-              <a:ext uri="{FF2B5EF4-FFF2-40B4-BE49-F238E27FC236}">
-                <a16:creationId xmlns:a16="http://schemas.microsoft.com/office/drawing/2014/main" id="{29197524-5C36-FE43-98F5-D443ECCD8853}"/>
-              </a:ext>
-            </a:extLst>
-          </p:cNvPr>
-          <p:cNvSpPr>
-            <a:spLocks noGrp="1"/>
-          </p:cNvSpPr>
-          <p:nvPr>
-            <p:ph type="body" sz="half" idx="2"/>
-          </p:nvPr>
-        </p:nvSpPr>
-        <p:spPr>
-          <a:xfrm>
-            <a:off x="839788" y="3727174"/>
-            <a:ext cx="3932237" cy="2141814"/>
-          </a:xfrm>
-        </p:spPr>
-        <p:txBody>
-          <a:bodyPr/>
-          <a:lstStyle/>
-          <a:p>
-            <a:endParaRPr lang="en-US" dirty="0"/>
-          </a:p>
-        </p:txBody>
-      </p:sp>
       <p:pic>
         <p:nvPicPr>
           <p:cNvPr id="8" name="Picture 7" descr="A picture containing computer&#10;&#10;Description automatically generated">
@@ -24331,132 +24279,6 @@
       </p:grpSpPr>
       <p:sp>
         <p:nvSpPr>
-          <p:cNvPr id="11" name="Rectangle 10">
-            <a:extLst>
-              <a:ext uri="{FF2B5EF4-FFF2-40B4-BE49-F238E27FC236}">
-                <a16:creationId xmlns:a16="http://schemas.microsoft.com/office/drawing/2014/main" id="{6753252F-4873-4F63-801D-CC719279A7D5}"/>
-              </a:ext>
-              <a:ext uri="{C183D7F6-B498-43B3-948B-1728B52AA6E4}">
-                <adec:decorative xmlns:adec="http://schemas.microsoft.com/office/drawing/2017/decorative" val="1"/>
-              </a:ext>
-            </a:extLst>
-          </p:cNvPr>
-          <p:cNvSpPr>
-            <a:spLocks noGrp="1" noRot="1" noChangeAspect="1" noMove="1" noResize="1" noEditPoints="1" noAdjustHandles="1" noChangeArrowheads="1" noChangeShapeType="1" noTextEdit="1"/>
-          </p:cNvSpPr>
-          <p:nvPr>
-            <p:extLst>
-              <p:ext uri="{386F3935-93C4-4BCD-93E2-E3B085C9AB24}">
-                <p16:designElem xmlns:p16="http://schemas.microsoft.com/office/powerpoint/2015/main" val="1"/>
-              </p:ext>
-            </p:extLst>
-          </p:nvPr>
-        </p:nvSpPr>
-        <p:spPr>
-          <a:xfrm>
-            <a:off x="0" y="0"/>
-            <a:ext cx="12192000" cy="6858000"/>
-          </a:xfrm>
-          <a:prstGeom prst="rect">
-            <a:avLst/>
-          </a:prstGeom>
-          <a:solidFill>
-            <a:srgbClr val="FFFFFF"/>
-          </a:solidFill>
-          <a:ln>
-            <a:noFill/>
-          </a:ln>
-        </p:spPr>
-        <p:style>
-          <a:lnRef idx="2">
-            <a:schemeClr val="accent1">
-              <a:shade val="50000"/>
-            </a:schemeClr>
-          </a:lnRef>
-          <a:fillRef idx="1">
-            <a:schemeClr val="accent1"/>
-          </a:fillRef>
-          <a:effectRef idx="0">
-            <a:schemeClr val="accent1"/>
-          </a:effectRef>
-          <a:fontRef idx="minor">
-            <a:schemeClr val="lt1"/>
-          </a:fontRef>
-        </p:style>
-        <p:txBody>
-          <a:bodyPr rtlCol="0" anchor="ctr"/>
-          <a:lstStyle/>
-          <a:p>
-            <a:pPr algn="ctr"/>
-            <a:endParaRPr lang="en-US"/>
-          </a:p>
-        </p:txBody>
-      </p:sp>
-      <p:sp>
-        <p:nvSpPr>
-          <p:cNvPr id="13" name="Rectangle 12">
-            <a:extLst>
-              <a:ext uri="{FF2B5EF4-FFF2-40B4-BE49-F238E27FC236}">
-                <a16:creationId xmlns:a16="http://schemas.microsoft.com/office/drawing/2014/main" id="{047C8CCB-F95D-4249-92DD-651249D3535A}"/>
-              </a:ext>
-              <a:ext uri="{C183D7F6-B498-43B3-948B-1728B52AA6E4}">
-                <adec:decorative xmlns:adec="http://schemas.microsoft.com/office/drawing/2017/decorative" val="1"/>
-              </a:ext>
-            </a:extLst>
-          </p:cNvPr>
-          <p:cNvSpPr>
-            <a:spLocks noGrp="1" noRot="1" noChangeAspect="1" noMove="1" noResize="1" noEditPoints="1" noAdjustHandles="1" noChangeArrowheads="1" noChangeShapeType="1" noTextEdit="1"/>
-          </p:cNvSpPr>
-          <p:nvPr>
-            <p:extLst>
-              <p:ext uri="{386F3935-93C4-4BCD-93E2-E3B085C9AB24}">
-                <p16:designElem xmlns:p16="http://schemas.microsoft.com/office/powerpoint/2015/main" val="1"/>
-              </p:ext>
-            </p:extLst>
-          </p:nvPr>
-        </p:nvSpPr>
-        <p:spPr>
-          <a:xfrm>
-            <a:off x="0" y="0"/>
-            <a:ext cx="2013557" cy="6858000"/>
-          </a:xfrm>
-          <a:prstGeom prst="rect">
-            <a:avLst/>
-          </a:prstGeom>
-          <a:solidFill>
-            <a:srgbClr val="7F7F7F"/>
-          </a:solidFill>
-          <a:ln>
-            <a:noFill/>
-          </a:ln>
-        </p:spPr>
-        <p:style>
-          <a:lnRef idx="2">
-            <a:schemeClr val="accent1">
-              <a:shade val="50000"/>
-            </a:schemeClr>
-          </a:lnRef>
-          <a:fillRef idx="1">
-            <a:schemeClr val="accent1"/>
-          </a:fillRef>
-          <a:effectRef idx="0">
-            <a:schemeClr val="accent1"/>
-          </a:effectRef>
-          <a:fontRef idx="minor">
-            <a:schemeClr val="lt1"/>
-          </a:fontRef>
-        </p:style>
-        <p:txBody>
-          <a:bodyPr rtlCol="0" anchor="ctr"/>
-          <a:lstStyle/>
-          <a:p>
-            <a:pPr algn="ctr"/>
-            <a:endParaRPr lang="en-US"/>
-          </a:p>
-        </p:txBody>
-      </p:sp>
-      <p:sp>
-        <p:nvSpPr>
           <p:cNvPr id="2" name="Title 1">
             <a:extLst>
               <a:ext uri="{FF2B5EF4-FFF2-40B4-BE49-F238E27FC236}">
@@ -24473,20 +24295,12 @@
         </p:nvSpPr>
         <p:spPr>
           <a:xfrm>
-            <a:off x="640080" y="2074363"/>
-            <a:ext cx="2752354" cy="2709275"/>
+            <a:off x="838200" y="365125"/>
+            <a:ext cx="10515600" cy="1325563"/>
           </a:xfrm>
           <a:prstGeom prst="ellipse">
             <a:avLst/>
           </a:prstGeom>
-          <a:solidFill>
-            <a:srgbClr val="262626"/>
-          </a:solidFill>
-          <a:ln w="174625" cmpd="thinThick">
-            <a:solidFill>
-              <a:srgbClr val="262626"/>
-            </a:solidFill>
-          </a:ln>
         </p:spPr>
         <p:txBody>
           <a:bodyPr vert="horz" lIns="91440" tIns="45720" rIns="91440" bIns="45720" rtlCol="0" anchor="ctr">
@@ -24494,11 +24308,10 @@
           </a:bodyPr>
           <a:lstStyle/>
           <a:p>
-            <a:pPr algn="ctr"/>
             <a:r>
-              <a:rPr lang="en-US" sz="2600" b="1" kern="1200">
+              <a:rPr lang="en-US" sz="4400" b="1" kern="1200">
                 <a:solidFill>
-                  <a:srgbClr val="FFFFFF"/>
+                  <a:schemeClr val="tx1"/>
                 </a:solidFill>
                 <a:latin typeface="+mj-lt"/>
                 <a:ea typeface="+mj-ea"/>
@@ -24532,8 +24345,8 @@
         </p:blipFill>
         <p:spPr>
           <a:xfrm>
-            <a:off x="4306642" y="609600"/>
-            <a:ext cx="6652114" cy="5511800"/>
+            <a:off x="3156166" y="1825626"/>
+            <a:ext cx="5870143" cy="4351338"/>
           </a:xfrm>
           <a:prstGeom prst="rect">
             <a:avLst/>
@@ -24629,7 +24442,7 @@
             <p:ph idx="1"/>
             <p:extLst>
               <p:ext uri="{D42A27DB-BD31-4B8C-83A1-F6EECF244321}">
-                <p14:modId xmlns:p14="http://schemas.microsoft.com/office/powerpoint/2010/main" val="1788426650"/>
+                <p14:modId xmlns:p14="http://schemas.microsoft.com/office/powerpoint/2010/main" val="2255017263"/>
               </p:ext>
             </p:extLst>
           </p:nvPr>
@@ -24644,36 +24457,6 @@
           </a:graphicData>
         </a:graphic>
       </p:graphicFrame>
-      <p:pic>
-        <p:nvPicPr>
-          <p:cNvPr id="4" name="Picture 3">
-            <a:extLst>
-              <a:ext uri="{FF2B5EF4-FFF2-40B4-BE49-F238E27FC236}">
-                <a16:creationId xmlns:a16="http://schemas.microsoft.com/office/drawing/2014/main" id="{4379F41E-4DC7-2C4B-A097-1BD74E323B1B}"/>
-              </a:ext>
-            </a:extLst>
-          </p:cNvPr>
-          <p:cNvPicPr>
-            <a:picLocks noChangeAspect="1"/>
-          </p:cNvPicPr>
-          <p:nvPr/>
-        </p:nvPicPr>
-        <p:blipFill>
-          <a:blip r:embed="rId7"/>
-          <a:stretch>
-            <a:fillRect/>
-          </a:stretch>
-        </p:blipFill>
-        <p:spPr>
-          <a:xfrm>
-            <a:off x="0" y="0"/>
-            <a:ext cx="12192000" cy="6858000"/>
-          </a:xfrm>
-          <a:prstGeom prst="rect">
-            <a:avLst/>
-          </a:prstGeom>
-        </p:spPr>
-      </p:pic>
     </p:spTree>
     <p:extLst>
       <p:ext uri="{BB962C8B-B14F-4D97-AF65-F5344CB8AC3E}">

</xml_diff>